<commit_message>
Slide criado/Retirados esses MBs inuteis
</commit_message>
<xml_diff>
--- a/Sprint-6/Artefatos_Sprint6.pptx
+++ b/Sprint-6/Artefatos_Sprint6.pptx
@@ -4505,7 +4505,7 @@
               </a:lnSpc>
             </a:pPr>
             <a:r>
-              <a:rPr lang="pt-BR" sz="7200" b="1" strike="noStrike" spc="-1" dirty="0" smtClean="0">
+              <a:rPr lang="pt-BR" sz="7200" b="1" strike="noStrike" spc="-1" dirty="0">
                 <a:solidFill>
                   <a:srgbClr val="FFFFFF"/>
                 </a:solidFill>
@@ -4759,22 +4759,7 @@
                 <a:ea typeface="Arial"/>
               </a:rPr>
               <a:t>
-Artefato </a:t>
-            </a:r>
-            <a:r>
-              <a:rPr lang="pt-BR" sz="3600" b="1" strike="noStrike" spc="-1" dirty="0" smtClean="0">
-                <a:solidFill>
-                  <a:srgbClr val="FFFFFF"/>
-                </a:solidFill>
-                <a:uFill>
-                  <a:solidFill>
-                    <a:srgbClr val="FFFFFF"/>
-                  </a:solidFill>
-                </a:uFill>
-                <a:latin typeface="Arial"/>
-                <a:ea typeface="Arial"/>
-              </a:rPr>
-              <a:t>#1: </a:t>
+Artefato #1: </a:t>
             </a:r>
             <a:r>
               <a:rPr lang="pt-BR" sz="3600" b="1" strike="noStrike" spc="-1" dirty="0" err="1">
@@ -4960,22 +4945,7 @@
                 <a:ea typeface="Arial"/>
               </a:rPr>
               <a:t>
-Artefato </a:t>
-            </a:r>
-            <a:r>
-              <a:rPr lang="pt-BR" sz="3600" b="1" strike="noStrike" spc="-1" dirty="0" smtClean="0">
-                <a:solidFill>
-                  <a:srgbClr val="FFFFFF"/>
-                </a:solidFill>
-                <a:uFill>
-                  <a:solidFill>
-                    <a:srgbClr val="FFFFFF"/>
-                  </a:solidFill>
-                </a:uFill>
-                <a:latin typeface="Arial"/>
-                <a:ea typeface="Arial"/>
-              </a:rPr>
-              <a:t>#1: </a:t>
+Artefato #1: </a:t>
             </a:r>
             <a:r>
               <a:rPr lang="pt-BR" sz="3600" b="1" strike="noStrike" spc="-1" dirty="0" err="1">
@@ -5166,22 +5136,7 @@
                 <a:ea typeface="Arial"/>
               </a:rPr>
               <a:t>
-Artefato </a:t>
-            </a:r>
-            <a:r>
-              <a:rPr lang="pt-BR" sz="3600" b="1" strike="noStrike" spc="-1" dirty="0" smtClean="0">
-                <a:solidFill>
-                  <a:srgbClr val="FFFFFF"/>
-                </a:solidFill>
-                <a:uFill>
-                  <a:solidFill>
-                    <a:srgbClr val="FFFFFF"/>
-                  </a:solidFill>
-                </a:uFill>
-                <a:latin typeface="Arial"/>
-                <a:ea typeface="Arial"/>
-              </a:rPr>
-              <a:t>#1: </a:t>
+Artefato #1: </a:t>
             </a:r>
             <a:r>
               <a:rPr lang="pt-BR" sz="3600" b="1" strike="noStrike" spc="-1" dirty="0" err="1">
@@ -5372,22 +5327,7 @@
                 <a:ea typeface="Arial"/>
               </a:rPr>
               <a:t>
-Artefato </a:t>
-            </a:r>
-            <a:r>
-              <a:rPr lang="pt-BR" sz="3600" b="1" strike="noStrike" spc="-1" dirty="0" smtClean="0">
-                <a:solidFill>
-                  <a:srgbClr val="FFFFFF"/>
-                </a:solidFill>
-                <a:uFill>
-                  <a:solidFill>
-                    <a:srgbClr val="FFFFFF"/>
-                  </a:solidFill>
-                </a:uFill>
-                <a:latin typeface="Arial"/>
-                <a:ea typeface="Arial"/>
-              </a:rPr>
-              <a:t>#1: </a:t>
+Artefato #1: </a:t>
             </a:r>
             <a:r>
               <a:rPr lang="pt-BR" sz="3600" b="1" strike="noStrike" spc="-1" dirty="0" err="1">
@@ -5596,33 +5536,26 @@
       </p:sp>
       <p:pic>
         <p:nvPicPr>
-          <p:cNvPr id="82" name="Shape 47"/>
-          <p:cNvPicPr/>
+          <p:cNvPr id="2" name="Imagem 1"/>
+          <p:cNvPicPr>
+            <a:picLocks noChangeAspect="1"/>
+          </p:cNvPicPr>
           <p:nvPr/>
         </p:nvPicPr>
         <p:blipFill>
-          <a:blip r:embed="rId2">
-            <a:extLst>
-              <a:ext uri="{28A0092B-C50C-407E-A947-70E740481C1C}">
-                <a14:useLocalDpi xmlns:a14="http://schemas.microsoft.com/office/drawing/2010/main" val="0"/>
-              </a:ext>
-            </a:extLst>
-          </a:blip>
+          <a:blip r:embed="rId2"/>
           <a:stretch>
             <a:fillRect/>
           </a:stretch>
         </p:blipFill>
         <p:spPr>
           <a:xfrm>
-            <a:off x="1074858" y="2406025"/>
-            <a:ext cx="6958284" cy="1451949"/>
-          </a:xfrm>
-          <a:prstGeom prst="rect">
-            <a:avLst/>
-          </a:prstGeom>
-          <a:ln>
-            <a:noFill/>
-          </a:ln>
+            <a:off x="0" y="1535246"/>
+            <a:ext cx="9144000" cy="2200598"/>
+          </a:xfrm>
+          <a:prstGeom prst="rect">
+            <a:avLst/>
+          </a:prstGeom>
         </p:spPr>
       </p:pic>
     </p:spTree>
@@ -5736,28 +5669,22 @@
       </p:sp>
       <p:pic>
         <p:nvPicPr>
-          <p:cNvPr id="2" name="Imagem 1"/>
+          <p:cNvPr id="3" name="Imagem 2"/>
           <p:cNvPicPr>
             <a:picLocks noChangeAspect="1"/>
           </p:cNvPicPr>
           <p:nvPr/>
         </p:nvPicPr>
         <p:blipFill>
-          <a:blip r:embed="rId2">
-            <a:extLst>
-              <a:ext uri="{28A0092B-C50C-407E-A947-70E740481C1C}">
-                <a14:useLocalDpi xmlns:a14="http://schemas.microsoft.com/office/drawing/2010/main" val="0"/>
-              </a:ext>
-            </a:extLst>
-          </a:blip>
+          <a:blip r:embed="rId2"/>
           <a:stretch>
             <a:fillRect/>
           </a:stretch>
         </p:blipFill>
         <p:spPr>
           <a:xfrm>
-            <a:off x="0" y="2129316"/>
-            <a:ext cx="9144000" cy="2131778"/>
+            <a:off x="-180" y="1780681"/>
+            <a:ext cx="9144000" cy="2077438"/>
           </a:xfrm>
           <a:prstGeom prst="rect">
             <a:avLst/>
@@ -5914,43 +5841,6 @@
             </a:endParaRPr>
           </a:p>
           <a:p>
-            <a:pPr marL="457200" indent="-342720">
-              <a:lnSpc>
-                <a:spcPct val="136000"/>
-              </a:lnSpc>
-              <a:buClr>
-                <a:srgbClr val="000000"/>
-              </a:buClr>
-              <a:buFont typeface="Arial"/>
-              <a:buChar char="●"/>
-            </a:pPr>
-            <a:r>
-              <a:rPr lang="pt-BR" spc="-1" dirty="0" smtClean="0">
-                <a:solidFill>
-                  <a:srgbClr val="000000"/>
-                </a:solidFill>
-                <a:uFill>
-                  <a:solidFill>
-                    <a:srgbClr val="FFFFFF"/>
-                  </a:solidFill>
-                </a:uFill>
-                <a:latin typeface="Times New Roman"/>
-              </a:rPr>
-              <a:t>Acessar o documento Reuniões dentro da pasta da Sprint-5</a:t>
-            </a:r>
-            <a:endParaRPr lang="pt-BR" sz="1400" b="0" strike="noStrike" spc="-1" dirty="0" smtClean="0">
-              <a:solidFill>
-                <a:srgbClr val="000000"/>
-              </a:solidFill>
-              <a:uFill>
-                <a:solidFill>
-                  <a:srgbClr val="FFFFFF"/>
-                </a:solidFill>
-              </a:uFill>
-              <a:latin typeface="Arial"/>
-            </a:endParaRPr>
-          </a:p>
-          <a:p>
             <a:pPr>
               <a:lnSpc>
                 <a:spcPct val="136000"/>
@@ -6156,157 +6046,76 @@
           <a:bodyPr tIns="91440" bIns="91440"/>
           <a:lstStyle/>
           <a:p>
-            <a:pPr marL="285750" lvl="0" indent="-285750" algn="just" fontAlgn="base">
+            <a:pPr marL="342900" lvl="0" indent="-342900" fontAlgn="base">
               <a:buFont typeface="Arial" panose="020B0604020202020204" pitchFamily="34" charset="0"/>
               <a:buChar char="•"/>
             </a:pPr>
             <a:r>
-              <a:rPr lang="pt-BR" sz="1400" b="1" dirty="0"/>
+              <a:rPr lang="pt-BR" sz="2000" b="1" dirty="0"/>
               <a:t>O que foi bem </a:t>
             </a:r>
-            <a:endParaRPr lang="pt-BR" sz="1400" dirty="0"/>
-          </a:p>
-          <a:p>
-            <a:pPr algn="just"/>
+            <a:endParaRPr lang="pt-BR" sz="2000" dirty="0"/>
+          </a:p>
+          <a:p>
             <a:r>
-              <a:rPr lang="pt-BR" sz="1400" dirty="0" smtClean="0"/>
-              <a:t>	A </a:t>
+              <a:rPr lang="pt-BR" sz="1100" dirty="0"/>
+              <a:t>	</a:t>
             </a:r>
             <a:r>
-              <a:rPr lang="pt-BR" sz="1400" dirty="0"/>
-              <a:t>equipe alcançou os objetivos propostos.</a:t>
+              <a:rPr lang="pt-BR" dirty="0"/>
+              <a:t>A equipe não teve dificuldades na Implementação das funcionalidades desta Sprint.</a:t>
             </a:r>
           </a:p>
           <a:p>
-            <a:pPr algn="just"/>
             <a:r>
-              <a:rPr lang="pt-BR" sz="1400" dirty="0" smtClean="0"/>
-              <a:t>	A </a:t>
+              <a:rPr lang="pt-BR" sz="1100" dirty="0"/>
+              <a:t> </a:t>
             </a:r>
-            <a:r>
-              <a:rPr lang="pt-BR" sz="1400" dirty="0"/>
-              <a:t>equipe fez um bom planejamento da Sprint, definindo bem os objetivos e o tempo </a:t>
-            </a:r>
-            <a:r>
-              <a:rPr lang="pt-BR" sz="1400" dirty="0" smtClean="0"/>
-              <a:t>	necessário</a:t>
-            </a:r>
-            <a:r>
-              <a:rPr lang="pt-BR" sz="1400" dirty="0"/>
-              <a:t>.</a:t>
-            </a:r>
-          </a:p>
-          <a:p>
-            <a:pPr algn="just"/>
-            <a:r>
-              <a:rPr lang="pt-BR" sz="1400" dirty="0" smtClean="0"/>
-              <a:t>	As </a:t>
-            </a:r>
-            <a:r>
-              <a:rPr lang="pt-BR" sz="1400" dirty="0"/>
-              <a:t>reuniões da equipe foram efetivas durante o desenvolvimento na Sprint.</a:t>
-            </a:r>
-          </a:p>
-          <a:p>
-            <a:pPr marL="285750" lvl="0" indent="-285750" algn="just" fontAlgn="base">
+          </a:p>
+          <a:p>
+            <a:pPr marL="342900" lvl="0" indent="-342900" fontAlgn="base">
               <a:buFont typeface="Arial" panose="020B0604020202020204" pitchFamily="34" charset="0"/>
               <a:buChar char="•"/>
             </a:pPr>
             <a:r>
-              <a:rPr lang="pt-BR" sz="1400" b="1" dirty="0" smtClean="0"/>
-              <a:t>O </a:t>
+              <a:rPr lang="pt-BR" sz="2000" b="1" dirty="0"/>
+              <a:t>O que não foi tão bem</a:t>
+            </a:r>
+            <a:endParaRPr lang="pt-BR" sz="2000" dirty="0"/>
+          </a:p>
+          <a:p>
+            <a:r>
+              <a:rPr lang="pt-BR" dirty="0"/>
+              <a:t>	Mudanças nas regras de negócios causou transição de Telas e </a:t>
             </a:r>
             <a:r>
-              <a:rPr lang="pt-BR" sz="1400" b="1" dirty="0"/>
-              <a:t>que não foi tão bem</a:t>
-            </a:r>
-            <a:endParaRPr lang="pt-BR" sz="1400" dirty="0"/>
-          </a:p>
-          <a:p>
-            <a:pPr algn="just"/>
-            <a:r>
-              <a:rPr lang="pt-BR" sz="1400" dirty="0" smtClean="0"/>
-              <a:t>	A </a:t>
+              <a:rPr lang="pt-BR" dirty="0" err="1"/>
+              <a:t>refatoração</a:t>
             </a:r>
             <a:r>
-              <a:rPr lang="pt-BR" sz="1400" dirty="0"/>
-              <a:t>equipe se limitou a fazer um trabalho mais leve, pela indisponibilidade de tempo por </a:t>
+              <a:rPr lang="pt-BR" dirty="0"/>
+              <a:t> do código.</a:t>
             </a:r>
-            <a:r>
-              <a:rPr lang="pt-BR" sz="1400" dirty="0" smtClean="0"/>
-              <a:t>	parte </a:t>
-            </a:r>
-            <a:r>
-              <a:rPr lang="pt-BR" sz="1400" dirty="0"/>
-              <a:t>dos integrantes.</a:t>
-            </a:r>
-          </a:p>
-          <a:p>
-            <a:pPr algn="just"/>
-            <a:r>
-              <a:rPr lang="pt-BR" sz="1400" dirty="0" smtClean="0"/>
-              <a:t>	Breno </a:t>
-            </a:r>
-            <a:r>
-              <a:rPr lang="pt-BR" sz="1400" dirty="0"/>
-              <a:t>– estava preparando e organizando o material para a oficina que dará na II Jornada </a:t>
-            </a:r>
-            <a:r>
-              <a:rPr lang="pt-BR" sz="1400" dirty="0" smtClean="0"/>
-              <a:t>	de </a:t>
-            </a:r>
-            <a:r>
-              <a:rPr lang="pt-BR" sz="1400" dirty="0"/>
-              <a:t>Atualização de Tecnologia da Informação.</a:t>
-            </a:r>
-          </a:p>
-          <a:p>
-            <a:pPr algn="just"/>
-            <a:r>
-              <a:rPr lang="pt-BR" sz="1400" dirty="0" smtClean="0"/>
-              <a:t>	Danilo </a:t>
-            </a:r>
-            <a:r>
-              <a:rPr lang="pt-BR" sz="1400" dirty="0"/>
-              <a:t>– Não disponibilidade às tardes por estar realizando treinamento de Jovem </a:t>
-            </a:r>
-            <a:r>
-              <a:rPr lang="pt-BR" sz="1400" dirty="0" smtClean="0"/>
-              <a:t>	Aprendiz</a:t>
-            </a:r>
-            <a:r>
-              <a:rPr lang="pt-BR" sz="1400" dirty="0"/>
-              <a:t>.</a:t>
-            </a:r>
-          </a:p>
-          <a:p>
-            <a:pPr marL="285750" lvl="0" indent="-285750" algn="just" fontAlgn="base">
+          </a:p>
+          <a:p>
+            <a:pPr marL="342900" lvl="0" indent="-342900" fontAlgn="base">
               <a:buFont typeface="Arial" panose="020B0604020202020204" pitchFamily="34" charset="0"/>
               <a:buChar char="•"/>
             </a:pPr>
             <a:r>
-              <a:rPr lang="pt-BR" sz="1400" b="1" dirty="0"/>
+              <a:rPr lang="pt-BR" sz="2000" b="1" dirty="0"/>
               <a:t>Melhoras</a:t>
             </a:r>
-            <a:endParaRPr lang="pt-BR" sz="1400" dirty="0"/>
-          </a:p>
-          <a:p>
-            <a:pPr algn="just"/>
+            <a:endParaRPr lang="pt-BR" sz="2000" dirty="0"/>
+          </a:p>
+          <a:p>
             <a:r>
-              <a:rPr lang="pt-BR" sz="1400" dirty="0" smtClean="0"/>
-              <a:t>	Buscar </a:t>
+              <a:rPr lang="pt-BR"/>
+              <a:t>	Elaborar </a:t>
             </a:r>
             <a:r>
-              <a:rPr lang="pt-BR" sz="1400" dirty="0"/>
-              <a:t>formas mais produtivas e efetivas de desenvolvimento, pois a partir dessa Sprint o </a:t>
-            </a:r>
-            <a:r>
-              <a:rPr lang="pt-BR" sz="1400" dirty="0" smtClean="0"/>
-              <a:t>	tempo </a:t>
-            </a:r>
-            <a:r>
-              <a:rPr lang="pt-BR" sz="1400" dirty="0"/>
-              <a:t>disponível para desenvolvimento será mais limitado.</a:t>
+              <a:rPr lang="pt-BR" dirty="0"/>
+              <a:t>uma revisão do sistema para evitar erros futuros e possíveis mudanças.</a:t>
             </a:r>
           </a:p>
           <a:p>

</xml_diff>